<commit_message>
fixed the navbar toggle functionality for small windows (e.g. smart phones)
</commit_message>
<xml_diff>
--- a/images/drawings.pptx
+++ b/images/drawings.pptx
@@ -8,7 +8,8 @@
     <p:sldId id="280" r:id="rId2"/>
     <p:sldId id="290" r:id="rId3"/>
     <p:sldId id="291" r:id="rId4"/>
-    <p:sldId id="289" r:id="rId5"/>
+    <p:sldId id="292" r:id="rId5"/>
+    <p:sldId id="289" r:id="rId6"/>
   </p:sldIdLst>
   <p:sldSz cx="10972800" cy="10972800"/>
   <p:notesSz cx="6858000" cy="9144000"/>
@@ -3738,10 +3739,6 @@
                 </a:rPr>
                 <a:t>Runtime Overhead (s)</a:t>
               </a:r>
-              <a:endParaRPr lang="en-US" sz="2800" dirty="0" smtClean="0">
-                <a:latin typeface="Calibri"/>
-                <a:cs typeface="Calibri"/>
-              </a:endParaRPr>
             </a:p>
           </p:txBody>
         </p:sp>
@@ -3873,10 +3870,6 @@
                 </a:rPr>
                 <a:t>20</a:t>
               </a:r>
-              <a:endParaRPr lang="en-US" sz="2800" dirty="0" smtClean="0">
-                <a:latin typeface="Calibri"/>
-                <a:cs typeface="Calibri"/>
-              </a:endParaRPr>
             </a:p>
           </p:txBody>
         </p:sp>
@@ -3953,19 +3946,8 @@
                   <a:latin typeface="Calibri"/>
                   <a:cs typeface="Calibri"/>
                 </a:rPr>
-                <a:t>5</a:t>
+                <a:t>50</a:t>
               </a:r>
-              <a:r>
-                <a:rPr lang="en-US" sz="2800" dirty="0" smtClean="0">
-                  <a:latin typeface="Calibri"/>
-                  <a:cs typeface="Calibri"/>
-                </a:rPr>
-                <a:t>0</a:t>
-              </a:r>
-              <a:endParaRPr lang="en-US" sz="2800" dirty="0" smtClean="0">
-                <a:latin typeface="Calibri"/>
-                <a:cs typeface="Calibri"/>
-              </a:endParaRPr>
             </a:p>
           </p:txBody>
         </p:sp>
@@ -4042,19 +4024,8 @@
                   <a:latin typeface="Calibri"/>
                   <a:cs typeface="Calibri"/>
                 </a:rPr>
-                <a:t>10</a:t>
+                <a:t>100</a:t>
               </a:r>
-              <a:r>
-                <a:rPr lang="en-US" sz="2800" dirty="0" smtClean="0">
-                  <a:latin typeface="Calibri"/>
-                  <a:cs typeface="Calibri"/>
-                </a:rPr>
-                <a:t>0</a:t>
-              </a:r>
-              <a:endParaRPr lang="en-US" sz="2800" dirty="0" smtClean="0">
-                <a:latin typeface="Calibri"/>
-                <a:cs typeface="Calibri"/>
-              </a:endParaRPr>
             </a:p>
           </p:txBody>
         </p:sp>
@@ -4148,10 +4119,6 @@
                 </a:rPr>
                 <a:t>20</a:t>
               </a:r>
-              <a:endParaRPr lang="en-US" sz="2800" dirty="0" smtClean="0">
-                <a:latin typeface="Calibri"/>
-                <a:cs typeface="Calibri"/>
-              </a:endParaRPr>
             </a:p>
           </p:txBody>
         </p:sp>
@@ -4228,19 +4195,8 @@
                   <a:latin typeface="Calibri"/>
                   <a:cs typeface="Calibri"/>
                 </a:rPr>
-                <a:t>5</a:t>
+                <a:t>50</a:t>
               </a:r>
-              <a:r>
-                <a:rPr lang="en-US" sz="2800" dirty="0" smtClean="0">
-                  <a:latin typeface="Calibri"/>
-                  <a:cs typeface="Calibri"/>
-                </a:rPr>
-                <a:t>0</a:t>
-              </a:r>
-              <a:endParaRPr lang="en-US" sz="2800" dirty="0" smtClean="0">
-                <a:latin typeface="Calibri"/>
-                <a:cs typeface="Calibri"/>
-              </a:endParaRPr>
             </a:p>
           </p:txBody>
         </p:sp>
@@ -4317,19 +4273,8 @@
                   <a:latin typeface="Calibri"/>
                   <a:cs typeface="Calibri"/>
                 </a:rPr>
-                <a:t>10</a:t>
+                <a:t>100</a:t>
               </a:r>
-              <a:r>
-                <a:rPr lang="en-US" sz="2800" dirty="0" smtClean="0">
-                  <a:latin typeface="Calibri"/>
-                  <a:cs typeface="Calibri"/>
-                </a:rPr>
-                <a:t>0</a:t>
-              </a:r>
-              <a:endParaRPr lang="en-US" sz="2800" dirty="0" smtClean="0">
-                <a:latin typeface="Calibri"/>
-                <a:cs typeface="Calibri"/>
-              </a:endParaRPr>
             </a:p>
           </p:txBody>
         </p:sp>
@@ -4423,10 +4368,6 @@
                 </a:rPr>
                 <a:t>20</a:t>
               </a:r>
-              <a:endParaRPr lang="en-US" sz="2800" dirty="0" smtClean="0">
-                <a:latin typeface="Calibri"/>
-                <a:cs typeface="Calibri"/>
-              </a:endParaRPr>
             </a:p>
           </p:txBody>
         </p:sp>
@@ -4503,19 +4444,8 @@
                   <a:latin typeface="Calibri"/>
                   <a:cs typeface="Calibri"/>
                 </a:rPr>
-                <a:t>5</a:t>
+                <a:t>50</a:t>
               </a:r>
-              <a:r>
-                <a:rPr lang="en-US" sz="2800" dirty="0" smtClean="0">
-                  <a:latin typeface="Calibri"/>
-                  <a:cs typeface="Calibri"/>
-                </a:rPr>
-                <a:t>0</a:t>
-              </a:r>
-              <a:endParaRPr lang="en-US" sz="2800" dirty="0" smtClean="0">
-                <a:latin typeface="Calibri"/>
-                <a:cs typeface="Calibri"/>
-              </a:endParaRPr>
             </a:p>
           </p:txBody>
         </p:sp>
@@ -4592,19 +4522,8 @@
                   <a:latin typeface="Calibri"/>
                   <a:cs typeface="Calibri"/>
                 </a:rPr>
-                <a:t>10</a:t>
+                <a:t>100</a:t>
               </a:r>
-              <a:r>
-                <a:rPr lang="en-US" sz="2800" dirty="0" smtClean="0">
-                  <a:latin typeface="Calibri"/>
-                  <a:cs typeface="Calibri"/>
-                </a:rPr>
-                <a:t>0</a:t>
-              </a:r>
-              <a:endParaRPr lang="en-US" sz="2800" dirty="0" smtClean="0">
-                <a:latin typeface="Calibri"/>
-                <a:cs typeface="Calibri"/>
-              </a:endParaRPr>
             </a:p>
           </p:txBody>
         </p:sp>
@@ -4639,10 +4558,6 @@
               </a:rPr>
               <a:t>Number of Workers</a:t>
             </a:r>
-            <a:endParaRPr lang="en-US" sz="2800" dirty="0" smtClean="0">
-              <a:latin typeface="Calibri"/>
-              <a:cs typeface="Calibri"/>
-            </a:endParaRPr>
           </a:p>
         </p:txBody>
       </p:sp>
@@ -4676,10 +4591,6 @@
               </a:rPr>
               <a:t>≈1</a:t>
             </a:r>
-            <a:endParaRPr lang="en-US" sz="2800" dirty="0" smtClean="0">
-              <a:latin typeface="Calibri"/>
-              <a:cs typeface="Calibri"/>
-            </a:endParaRPr>
           </a:p>
         </p:txBody>
       </p:sp>
@@ -4713,10 +4624,6 @@
               </a:rPr>
               <a:t>≈1</a:t>
             </a:r>
-            <a:endParaRPr lang="en-US" sz="2800" dirty="0" smtClean="0">
-              <a:latin typeface="Calibri"/>
-              <a:cs typeface="Calibri"/>
-            </a:endParaRPr>
           </a:p>
         </p:txBody>
       </p:sp>
@@ -4750,10 +4657,6 @@
               </a:rPr>
               <a:t>≈0.02</a:t>
             </a:r>
-            <a:endParaRPr lang="en-US" sz="2800" dirty="0" smtClean="0">
-              <a:latin typeface="Calibri"/>
-              <a:cs typeface="Calibri"/>
-            </a:endParaRPr>
           </a:p>
         </p:txBody>
       </p:sp>
@@ -5714,6 +5617,633 @@
         </p:nvSpPr>
         <p:spPr>
           <a:xfrm>
+            <a:off x="1472508" y="5994400"/>
+            <a:ext cx="7315200" cy="914400"/>
+          </a:xfrm>
+          <a:prstGeom prst="rect">
+            <a:avLst/>
+          </a:prstGeom>
+          <a:solidFill>
+            <a:srgbClr val="008000"/>
+          </a:solidFill>
+          <a:ln w="25400">
+            <a:noFill/>
+          </a:ln>
+          <a:effectLst/>
+        </p:spPr>
+        <p:style>
+          <a:lnRef idx="1">
+            <a:schemeClr val="accent1"/>
+          </a:lnRef>
+          <a:fillRef idx="3">
+            <a:schemeClr val="accent1"/>
+          </a:fillRef>
+          <a:effectRef idx="2">
+            <a:schemeClr val="accent1"/>
+          </a:effectRef>
+          <a:fontRef idx="minor">
+            <a:schemeClr val="lt1"/>
+          </a:fontRef>
+        </p:style>
+        <p:txBody>
+          <a:bodyPr rtlCol="0" anchor="ctr"/>
+          <a:lstStyle/>
+          <a:p>
+            <a:pPr algn="ctr"/>
+            <a:endParaRPr lang="en-US"/>
+          </a:p>
+        </p:txBody>
+      </p:sp>
+      <p:sp>
+        <p:nvSpPr>
+          <p:cNvPr id="33" name="Rectangle 32"/>
+          <p:cNvSpPr/>
+          <p:nvPr/>
+        </p:nvSpPr>
+        <p:spPr>
+          <a:xfrm>
+            <a:off x="1472508" y="6993465"/>
+            <a:ext cx="1353312" cy="914400"/>
+          </a:xfrm>
+          <a:prstGeom prst="rect">
+            <a:avLst/>
+          </a:prstGeom>
+          <a:solidFill>
+            <a:srgbClr val="1DE13A"/>
+          </a:solidFill>
+          <a:ln w="25400">
+            <a:noFill/>
+          </a:ln>
+          <a:effectLst/>
+        </p:spPr>
+        <p:style>
+          <a:lnRef idx="1">
+            <a:schemeClr val="accent1"/>
+          </a:lnRef>
+          <a:fillRef idx="3">
+            <a:schemeClr val="accent1"/>
+          </a:fillRef>
+          <a:effectRef idx="2">
+            <a:schemeClr val="accent1"/>
+          </a:effectRef>
+          <a:fontRef idx="minor">
+            <a:schemeClr val="lt1"/>
+          </a:fontRef>
+        </p:style>
+        <p:txBody>
+          <a:bodyPr rtlCol="0" anchor="ctr"/>
+          <a:lstStyle/>
+          <a:p>
+            <a:pPr algn="ctr"/>
+            <a:endParaRPr lang="en-US"/>
+          </a:p>
+        </p:txBody>
+      </p:sp>
+      <p:sp>
+        <p:nvSpPr>
+          <p:cNvPr id="34" name="Rectangle 33"/>
+          <p:cNvSpPr/>
+          <p:nvPr/>
+        </p:nvSpPr>
+        <p:spPr>
+          <a:xfrm>
+            <a:off x="1472508" y="7992530"/>
+            <a:ext cx="1170432" cy="914400"/>
+          </a:xfrm>
+          <a:prstGeom prst="rect">
+            <a:avLst/>
+          </a:prstGeom>
+          <a:solidFill>
+            <a:srgbClr val="0000FF"/>
+          </a:solidFill>
+          <a:ln w="25400">
+            <a:noFill/>
+          </a:ln>
+          <a:effectLst/>
+        </p:spPr>
+        <p:style>
+          <a:lnRef idx="1">
+            <a:schemeClr val="accent1"/>
+          </a:lnRef>
+          <a:fillRef idx="3">
+            <a:schemeClr val="accent1"/>
+          </a:fillRef>
+          <a:effectRef idx="2">
+            <a:schemeClr val="accent1"/>
+          </a:effectRef>
+          <a:fontRef idx="minor">
+            <a:schemeClr val="lt1"/>
+          </a:fontRef>
+        </p:style>
+        <p:txBody>
+          <a:bodyPr rtlCol="0" anchor="ctr"/>
+          <a:lstStyle/>
+          <a:p>
+            <a:pPr algn="ctr"/>
+            <a:endParaRPr lang="en-US"/>
+          </a:p>
+        </p:txBody>
+      </p:sp>
+      <p:sp>
+        <p:nvSpPr>
+          <p:cNvPr id="65" name="TextBox 64"/>
+          <p:cNvSpPr txBox="1"/>
+          <p:nvPr/>
+        </p:nvSpPr>
+        <p:spPr>
+          <a:xfrm>
+            <a:off x="8618356" y="6140912"/>
+            <a:ext cx="1117600" cy="523214"/>
+          </a:xfrm>
+          <a:prstGeom prst="rect">
+            <a:avLst/>
+          </a:prstGeom>
+          <a:noFill/>
+        </p:spPr>
+        <p:txBody>
+          <a:bodyPr wrap="square" lIns="91434" tIns="45717" rIns="91434" bIns="45717" rtlCol="0">
+            <a:spAutoFit/>
+          </a:bodyPr>
+          <a:lstStyle/>
+          <a:p>
+            <a:pPr algn="r"/>
+            <a:r>
+              <a:rPr lang="en-US" sz="2800" dirty="0" smtClean="0">
+                <a:latin typeface="Calibri"/>
+                <a:cs typeface="Calibri"/>
+              </a:rPr>
+              <a:t>196.8</a:t>
+            </a:r>
+          </a:p>
+        </p:txBody>
+      </p:sp>
+      <p:grpSp>
+        <p:nvGrpSpPr>
+          <p:cNvPr id="2" name="Group 25"/>
+          <p:cNvGrpSpPr/>
+          <p:nvPr/>
+        </p:nvGrpSpPr>
+        <p:grpSpPr>
+          <a:xfrm>
+            <a:off x="5612891" y="7347697"/>
+            <a:ext cx="3785110" cy="1494241"/>
+            <a:chOff x="5002598" y="7381563"/>
+            <a:chExt cx="3785110" cy="1494241"/>
+          </a:xfrm>
+        </p:grpSpPr>
+        <p:grpSp>
+          <p:nvGrpSpPr>
+            <p:cNvPr id="3" name="Group 46"/>
+            <p:cNvGrpSpPr/>
+            <p:nvPr/>
+          </p:nvGrpSpPr>
+          <p:grpSpPr>
+            <a:xfrm>
+              <a:off x="5002598" y="7381563"/>
+              <a:ext cx="3785110" cy="492436"/>
+              <a:chOff x="2128172" y="585753"/>
+              <a:chExt cx="3785110" cy="492436"/>
+            </a:xfrm>
+          </p:grpSpPr>
+          <p:sp>
+            <p:nvSpPr>
+              <p:cNvPr id="22" name="TextBox 21"/>
+              <p:cNvSpPr txBox="1"/>
+              <p:nvPr/>
+            </p:nvSpPr>
+            <p:spPr>
+              <a:xfrm>
+                <a:off x="2619247" y="585753"/>
+                <a:ext cx="3294035" cy="492436"/>
+              </a:xfrm>
+              <a:prstGeom prst="rect">
+                <a:avLst/>
+              </a:prstGeom>
+              <a:noFill/>
+            </p:spPr>
+            <p:txBody>
+              <a:bodyPr wrap="square" lIns="91434" tIns="45717" rIns="91434" bIns="45717" rtlCol="0">
+                <a:spAutoFit/>
+              </a:bodyPr>
+              <a:lstStyle/>
+              <a:p>
+                <a:r>
+                  <a:rPr lang="en-US" sz="2600" dirty="0" smtClean="0">
+                    <a:latin typeface="Calibri"/>
+                    <a:cs typeface="Calibri"/>
+                  </a:rPr>
+                  <a:t>Nimbus /wo templates</a:t>
+                </a:r>
+              </a:p>
+            </p:txBody>
+          </p:sp>
+          <p:sp>
+            <p:nvSpPr>
+              <p:cNvPr id="44" name="Rounded Rectangle 43"/>
+              <p:cNvSpPr>
+                <a:spLocks/>
+              </p:cNvSpPr>
+              <p:nvPr/>
+            </p:nvSpPr>
+            <p:spPr>
+              <a:xfrm>
+                <a:off x="2128172" y="754517"/>
+                <a:ext cx="457200" cy="274320"/>
+              </a:xfrm>
+              <a:prstGeom prst="roundRect">
+                <a:avLst/>
+              </a:prstGeom>
+              <a:solidFill>
+                <a:srgbClr val="008000"/>
+              </a:solidFill>
+              <a:ln w="38100">
+                <a:noFill/>
+              </a:ln>
+              <a:effectLst/>
+            </p:spPr>
+            <p:style>
+              <a:lnRef idx="1">
+                <a:schemeClr val="accent1"/>
+              </a:lnRef>
+              <a:fillRef idx="3">
+                <a:schemeClr val="accent1"/>
+              </a:fillRef>
+              <a:effectRef idx="2">
+                <a:schemeClr val="accent1"/>
+              </a:effectRef>
+              <a:fontRef idx="minor">
+                <a:schemeClr val="lt1"/>
+              </a:fontRef>
+            </p:style>
+            <p:txBody>
+              <a:bodyPr rtlCol="0" anchor="ctr"/>
+              <a:lstStyle/>
+              <a:p>
+                <a:pPr algn="ctr"/>
+                <a:endParaRPr lang="en-US"/>
+              </a:p>
+            </p:txBody>
+          </p:sp>
+        </p:grpSp>
+        <p:grpSp>
+          <p:nvGrpSpPr>
+            <p:cNvPr id="4" name="Group 47"/>
+            <p:cNvGrpSpPr/>
+            <p:nvPr/>
+          </p:nvGrpSpPr>
+          <p:grpSpPr>
+            <a:xfrm>
+              <a:off x="5002598" y="7890932"/>
+              <a:ext cx="3309784" cy="492436"/>
+              <a:chOff x="2128172" y="585753"/>
+              <a:chExt cx="3309784" cy="492436"/>
+            </a:xfrm>
+          </p:grpSpPr>
+          <p:sp>
+            <p:nvSpPr>
+              <p:cNvPr id="49" name="TextBox 48"/>
+              <p:cNvSpPr txBox="1"/>
+              <p:nvPr/>
+            </p:nvSpPr>
+            <p:spPr>
+              <a:xfrm>
+                <a:off x="2619247" y="585753"/>
+                <a:ext cx="2818709" cy="492436"/>
+              </a:xfrm>
+              <a:prstGeom prst="rect">
+                <a:avLst/>
+              </a:prstGeom>
+              <a:noFill/>
+            </p:spPr>
+            <p:txBody>
+              <a:bodyPr wrap="square" lIns="91434" tIns="45717" rIns="91434" bIns="45717" rtlCol="0">
+                <a:spAutoFit/>
+              </a:bodyPr>
+              <a:lstStyle/>
+              <a:p>
+                <a:r>
+                  <a:rPr lang="en-US" sz="2600" dirty="0" smtClean="0">
+                    <a:latin typeface="Calibri"/>
+                    <a:cs typeface="Calibri"/>
+                  </a:rPr>
+                  <a:t>Nimbus</a:t>
+                </a:r>
+              </a:p>
+            </p:txBody>
+          </p:sp>
+          <p:sp>
+            <p:nvSpPr>
+              <p:cNvPr id="50" name="Rounded Rectangle 49"/>
+              <p:cNvSpPr>
+                <a:spLocks/>
+              </p:cNvSpPr>
+              <p:nvPr/>
+            </p:nvSpPr>
+            <p:spPr>
+              <a:xfrm>
+                <a:off x="2128172" y="754517"/>
+                <a:ext cx="457200" cy="274320"/>
+              </a:xfrm>
+              <a:prstGeom prst="roundRect">
+                <a:avLst/>
+              </a:prstGeom>
+              <a:solidFill>
+                <a:srgbClr val="1DE13A"/>
+              </a:solidFill>
+              <a:ln w="38100">
+                <a:noFill/>
+              </a:ln>
+              <a:effectLst/>
+            </p:spPr>
+            <p:style>
+              <a:lnRef idx="1">
+                <a:schemeClr val="accent1"/>
+              </a:lnRef>
+              <a:fillRef idx="3">
+                <a:schemeClr val="accent1"/>
+              </a:fillRef>
+              <a:effectRef idx="2">
+                <a:schemeClr val="accent1"/>
+              </a:effectRef>
+              <a:fontRef idx="minor">
+                <a:schemeClr val="lt1"/>
+              </a:fontRef>
+            </p:style>
+            <p:txBody>
+              <a:bodyPr rtlCol="0" anchor="ctr"/>
+              <a:lstStyle/>
+              <a:p>
+                <a:pPr algn="ctr"/>
+                <a:endParaRPr lang="en-US"/>
+              </a:p>
+            </p:txBody>
+          </p:sp>
+        </p:grpSp>
+        <p:grpSp>
+          <p:nvGrpSpPr>
+            <p:cNvPr id="5" name="Group 50"/>
+            <p:cNvGrpSpPr/>
+            <p:nvPr/>
+          </p:nvGrpSpPr>
+          <p:grpSpPr>
+            <a:xfrm>
+              <a:off x="5002598" y="8383368"/>
+              <a:ext cx="2351376" cy="492436"/>
+              <a:chOff x="2128172" y="585753"/>
+              <a:chExt cx="2351376" cy="492436"/>
+            </a:xfrm>
+          </p:grpSpPr>
+          <p:sp>
+            <p:nvSpPr>
+              <p:cNvPr id="52" name="TextBox 51"/>
+              <p:cNvSpPr txBox="1"/>
+              <p:nvPr/>
+            </p:nvSpPr>
+            <p:spPr>
+              <a:xfrm>
+                <a:off x="2619248" y="585753"/>
+                <a:ext cx="1860300" cy="492436"/>
+              </a:xfrm>
+              <a:prstGeom prst="rect">
+                <a:avLst/>
+              </a:prstGeom>
+              <a:noFill/>
+            </p:spPr>
+            <p:txBody>
+              <a:bodyPr wrap="square" lIns="91434" tIns="45717" rIns="91434" bIns="45717" rtlCol="0">
+                <a:spAutoFit/>
+              </a:bodyPr>
+              <a:lstStyle/>
+              <a:p>
+                <a:r>
+                  <a:rPr lang="en-US" sz="2600" dirty="0" smtClean="0">
+                    <a:latin typeface="Calibri"/>
+                    <a:cs typeface="Calibri"/>
+                  </a:rPr>
+                  <a:t>MPI</a:t>
+                </a:r>
+              </a:p>
+            </p:txBody>
+          </p:sp>
+          <p:sp>
+            <p:nvSpPr>
+              <p:cNvPr id="53" name="Rounded Rectangle 52"/>
+              <p:cNvSpPr>
+                <a:spLocks/>
+              </p:cNvSpPr>
+              <p:nvPr/>
+            </p:nvSpPr>
+            <p:spPr>
+              <a:xfrm>
+                <a:off x="2128172" y="754517"/>
+                <a:ext cx="457200" cy="274320"/>
+              </a:xfrm>
+              <a:prstGeom prst="roundRect">
+                <a:avLst/>
+              </a:prstGeom>
+              <a:solidFill>
+                <a:srgbClr val="0000FF"/>
+              </a:solidFill>
+              <a:ln w="38100">
+                <a:noFill/>
+              </a:ln>
+              <a:effectLst/>
+            </p:spPr>
+            <p:style>
+              <a:lnRef idx="1">
+                <a:schemeClr val="accent1"/>
+              </a:lnRef>
+              <a:fillRef idx="3">
+                <a:schemeClr val="accent1"/>
+              </a:fillRef>
+              <a:effectRef idx="2">
+                <a:schemeClr val="accent1"/>
+              </a:effectRef>
+              <a:fontRef idx="minor">
+                <a:schemeClr val="lt1"/>
+              </a:fontRef>
+            </p:style>
+            <p:txBody>
+              <a:bodyPr rtlCol="0" anchor="ctr"/>
+              <a:lstStyle/>
+              <a:p>
+                <a:pPr algn="ctr"/>
+                <a:endParaRPr lang="en-US"/>
+              </a:p>
+            </p:txBody>
+          </p:sp>
+        </p:grpSp>
+      </p:grpSp>
+      <p:cxnSp>
+        <p:nvCxnSpPr>
+          <p:cNvPr id="29" name="Straight Arrow Connector 28"/>
+          <p:cNvCxnSpPr/>
+          <p:nvPr/>
+        </p:nvCxnSpPr>
+        <p:spPr>
+          <a:xfrm rot="10800000">
+            <a:off x="1472510" y="5621952"/>
+            <a:ext cx="7925491" cy="1"/>
+          </a:xfrm>
+          <a:prstGeom prst="straightConnector1">
+            <a:avLst/>
+          </a:prstGeom>
+          <a:ln w="50800" cmpd="sng">
+            <a:solidFill>
+              <a:schemeClr val="tx1"/>
+            </a:solidFill>
+            <a:headEnd type="triangle"/>
+            <a:tailEnd type="none" w="med" len="med"/>
+          </a:ln>
+          <a:effectLst/>
+        </p:spPr>
+        <p:style>
+          <a:lnRef idx="2">
+            <a:schemeClr val="accent1"/>
+          </a:lnRef>
+          <a:fillRef idx="0">
+            <a:schemeClr val="accent1"/>
+          </a:fillRef>
+          <a:effectRef idx="1">
+            <a:schemeClr val="accent1"/>
+          </a:effectRef>
+          <a:fontRef idx="minor">
+            <a:schemeClr val="tx1"/>
+          </a:fontRef>
+        </p:style>
+      </p:cxnSp>
+      <p:sp>
+        <p:nvSpPr>
+          <p:cNvPr id="38" name="TextBox 37"/>
+          <p:cNvSpPr txBox="1"/>
+          <p:nvPr/>
+        </p:nvSpPr>
+        <p:spPr>
+          <a:xfrm>
+            <a:off x="4131674" y="5031006"/>
+            <a:ext cx="2714309" cy="523214"/>
+          </a:xfrm>
+          <a:prstGeom prst="rect">
+            <a:avLst/>
+          </a:prstGeom>
+          <a:noFill/>
+        </p:spPr>
+        <p:txBody>
+          <a:bodyPr wrap="square" lIns="91434" tIns="45717" rIns="91434" bIns="45717" rtlCol="0">
+            <a:spAutoFit/>
+          </a:bodyPr>
+          <a:lstStyle/>
+          <a:p>
+            <a:pPr algn="r"/>
+            <a:r>
+              <a:rPr lang="en-US" sz="2800" dirty="0" smtClean="0">
+                <a:latin typeface="Calibri"/>
+                <a:cs typeface="Calibri"/>
+              </a:rPr>
+              <a:t>Iteration Time (s) </a:t>
+            </a:r>
+          </a:p>
+        </p:txBody>
+      </p:sp>
+      <p:sp>
+        <p:nvSpPr>
+          <p:cNvPr id="39" name="TextBox 38"/>
+          <p:cNvSpPr txBox="1"/>
+          <p:nvPr/>
+        </p:nvSpPr>
+        <p:spPr>
+          <a:xfrm>
+            <a:off x="2521026" y="7179510"/>
+            <a:ext cx="1117599" cy="523214"/>
+          </a:xfrm>
+          <a:prstGeom prst="rect">
+            <a:avLst/>
+          </a:prstGeom>
+          <a:noFill/>
+        </p:spPr>
+        <p:txBody>
+          <a:bodyPr wrap="square" lIns="91434" tIns="45717" rIns="91434" bIns="45717" rtlCol="0">
+            <a:spAutoFit/>
+          </a:bodyPr>
+          <a:lstStyle/>
+          <a:p>
+            <a:pPr algn="r"/>
+            <a:r>
+              <a:rPr lang="en-US" sz="2800" dirty="0" smtClean="0">
+                <a:latin typeface="Calibri"/>
+                <a:cs typeface="Calibri"/>
+              </a:rPr>
+              <a:t>36.5</a:t>
+            </a:r>
+          </a:p>
+        </p:txBody>
+      </p:sp>
+      <p:sp>
+        <p:nvSpPr>
+          <p:cNvPr id="40" name="TextBox 39"/>
+          <p:cNvSpPr txBox="1"/>
+          <p:nvPr/>
+        </p:nvSpPr>
+        <p:spPr>
+          <a:xfrm>
+            <a:off x="2642939" y="8147449"/>
+            <a:ext cx="863605" cy="523214"/>
+          </a:xfrm>
+          <a:prstGeom prst="rect">
+            <a:avLst/>
+          </a:prstGeom>
+          <a:noFill/>
+        </p:spPr>
+        <p:txBody>
+          <a:bodyPr wrap="square" lIns="91434" tIns="45717" rIns="91434" bIns="45717" rtlCol="0">
+            <a:spAutoFit/>
+          </a:bodyPr>
+          <a:lstStyle/>
+          <a:p>
+            <a:pPr algn="r"/>
+            <a:r>
+              <a:rPr lang="en-US" sz="2800" dirty="0" smtClean="0">
+                <a:latin typeface="Calibri"/>
+                <a:cs typeface="Calibri"/>
+              </a:rPr>
+              <a:t>31.7</a:t>
+            </a:r>
+          </a:p>
+        </p:txBody>
+      </p:sp>
+    </p:spTree>
+  </p:cSld>
+  <p:clrMapOvr>
+    <a:masterClrMapping/>
+  </p:clrMapOvr>
+</p:sld>
+</file>
+
+<file path=ppt/slides/slide5.xml><?xml version="1.0" encoding="utf-8"?>
+<p:sld xmlns:a="http://schemas.openxmlformats.org/drawingml/2006/main" xmlns:r="http://schemas.openxmlformats.org/officeDocument/2006/relationships" xmlns:mc="http://schemas.openxmlformats.org/markup-compatibility/2006" xmlns:mv="urn:schemas-microsoft-com:mac:vml" xmlns:p="http://schemas.openxmlformats.org/presentationml/2006/main" mc:Ignorable="mv" mc:PreserveAttributes="mv:*">
+  <p:cSld>
+    <p:spTree>
+      <p:nvGrpSpPr>
+        <p:cNvPr id="1" name=""/>
+        <p:cNvGrpSpPr/>
+        <p:nvPr/>
+      </p:nvGrpSpPr>
+      <p:grpSpPr>
+        <a:xfrm>
+          <a:off x="0" y="0"/>
+          <a:ext cx="0" cy="0"/>
+          <a:chOff x="0" y="0"/>
+          <a:chExt cx="0" cy="0"/>
+        </a:xfrm>
+      </p:grpSpPr>
+      <p:sp>
+        <p:nvSpPr>
+          <p:cNvPr id="32" name="Rectangle 31"/>
+          <p:cNvSpPr/>
+          <p:nvPr/>
+        </p:nvSpPr>
+        <p:spPr>
+          <a:xfrm>
             <a:off x="1828800" y="3657600"/>
             <a:ext cx="7315200" cy="914400"/>
           </a:xfrm>

</xml_diff>